<commit_message>
Added WP to slides
</commit_message>
<xml_diff>
--- a/docs/13-09-26 Cross-platform mobile development with C#.pptx
+++ b/docs/13-09-26 Cross-platform mobile development with C#.pptx
@@ -45,21 +45,21 @@
   <p:notesSz cx="6858000" cy="9144000"/>
   <p:embeddedFontLst>
     <p:embeddedFont>
-      <p:font typeface="AA Zuehlke Medium" panose="02000603060000020004" pitchFamily="2" charset="0"/>
+      <p:font typeface="Wingdings 3" panose="05040102010807070707" pitchFamily="18" charset="2"/>
       <p:regular r:id="rId33"/>
     </p:embeddedFont>
     <p:embeddedFont>
-      <p:font typeface="Webdings" panose="05030102010509060703" pitchFamily="18" charset="2"/>
+      <p:font typeface="AA Zuehlke Medium" panose="02000603060000020004" pitchFamily="2" charset="0"/>
       <p:regular r:id="rId34"/>
     </p:embeddedFont>
     <p:embeddedFont>
-      <p:font typeface="Wingdings 3" panose="05040102010807070707" pitchFamily="18" charset="2"/>
+      <p:font typeface="AA Zuehlke" panose="02000503060000020004" pitchFamily="2" charset="0"/>
       <p:regular r:id="rId35"/>
+      <p:bold r:id="rId36"/>
     </p:embeddedFont>
     <p:embeddedFont>
-      <p:font typeface="AA Zuehlke" panose="02000503060000020004" pitchFamily="2" charset="0"/>
-      <p:regular r:id="rId36"/>
-      <p:bold r:id="rId37"/>
+      <p:font typeface="Webdings" panose="05030102010509060703" pitchFamily="18" charset="2"/>
+      <p:regular r:id="rId37"/>
     </p:embeddedFont>
   </p:embeddedFontLst>
   <p:custDataLst>
@@ -622,7 +622,6 @@
     </c:plotArea>
     <c:legend>
       <c:legendPos val="t"/>
-      <c:layout/>
       <c:overlay val="0"/>
     </c:legend>
     <c:plotVisOnly val="1"/>
@@ -731,7 +730,7 @@
               <a:rPr lang="de-DE" smtClean="0">
                 <a:latin typeface="AA Zuehlke" pitchFamily="2" charset="0"/>
               </a:rPr>
-              <a:t>17.09.2013</a:t>
+              <a:t>18.09.2013</a:t>
             </a:fld>
             <a:endParaRPr lang="de-DE">
               <a:latin typeface="AA Zuehlke" pitchFamily="2" charset="0"/>
@@ -909,7 +908,7 @@
             <a:fld id="{A6966AE6-B72D-4967-9CA3-8469D2863705}" type="datetimeFigureOut">
               <a:rPr lang="en-US" smtClean="0"/>
               <a:pPr/>
-              <a:t>9/17/2013</a:t>
+              <a:t>9/18/2013</a:t>
             </a:fld>
             <a:endParaRPr lang="en-US" dirty="0"/>
           </a:p>
@@ -21682,6 +21681,56 @@
       </p:grpSpPr>
       <p:sp>
         <p:nvSpPr>
+          <p:cNvPr id="33" name="Rounded Rectangle 32"/>
+          <p:cNvSpPr/>
+          <p:nvPr/>
+        </p:nvSpPr>
+        <p:spPr>
+          <a:xfrm>
+            <a:off x="3809244" y="1748139"/>
+            <a:ext cx="1440000" cy="2943450"/>
+          </a:xfrm>
+          <a:prstGeom prst="roundRect">
+            <a:avLst/>
+          </a:prstGeom>
+          <a:noFill/>
+          <a:ln w="38100" cmpd="sng">
+            <a:solidFill>
+              <a:schemeClr val="accent1"/>
+            </a:solidFill>
+          </a:ln>
+        </p:spPr>
+        <p:style>
+          <a:lnRef idx="2">
+            <a:schemeClr val="accent1">
+              <a:shade val="50000"/>
+            </a:schemeClr>
+          </a:lnRef>
+          <a:fillRef idx="1">
+            <a:schemeClr val="accent1"/>
+          </a:fillRef>
+          <a:effectRef idx="0">
+            <a:schemeClr val="accent1"/>
+          </a:effectRef>
+          <a:fontRef idx="minor">
+            <a:schemeClr val="lt1"/>
+          </a:fontRef>
+        </p:style>
+        <p:txBody>
+          <a:bodyPr rtlCol="0" anchor="t"/>
+          <a:lstStyle/>
+          <a:p>
+            <a:pPr algn="ctr"/>
+            <a:endParaRPr lang="en-US" dirty="0">
+              <a:solidFill>
+                <a:schemeClr val="tx1"/>
+              </a:solidFill>
+            </a:endParaRPr>
+          </a:p>
+        </p:txBody>
+      </p:sp>
+      <p:sp>
+        <p:nvSpPr>
           <p:cNvPr id="40" name="Rounded Rectangle 39"/>
           <p:cNvSpPr/>
           <p:nvPr/>
@@ -22424,7 +22473,7 @@
         </p:nvSpPr>
         <p:spPr>
           <a:xfrm>
-            <a:off x="1427874" y="2557540"/>
+            <a:off x="1427874" y="2547602"/>
             <a:ext cx="1296000" cy="354503"/>
           </a:xfrm>
           <a:prstGeom prst="roundRect">
@@ -22692,7 +22741,7 @@
         </p:nvSpPr>
         <p:spPr>
           <a:xfrm>
-            <a:off x="6342314" y="2537664"/>
+            <a:off x="6342314" y="2547602"/>
             <a:ext cx="1296000" cy="354503"/>
           </a:xfrm>
           <a:prstGeom prst="roundRect">
@@ -23115,113 +23164,161 @@
           </a:p>
         </p:txBody>
       </p:sp>
-      <p:sp>
-        <p:nvSpPr>
-          <p:cNvPr id="2" name="Rectangle 1"/>
-          <p:cNvSpPr/>
+      <p:pic>
+        <p:nvPicPr>
+          <p:cNvPr id="1026" name="Picture 2" descr="http://www.whats-up-news.fr/wp-content/uploads/2013/07/windows-phone8-logo.png"/>
+          <p:cNvPicPr>
+            <a:picLocks noChangeAspect="1" noChangeArrowheads="1"/>
+          </p:cNvPicPr>
           <p:nvPr/>
-        </p:nvSpPr>
-        <p:spPr>
-          <a:xfrm rot="19069080">
-            <a:off x="1294850" y="2844632"/>
-            <a:ext cx="5852885" cy="923330"/>
+        </p:nvPicPr>
+        <p:blipFill>
+          <a:blip r:embed="rId7" cstate="print">
+            <a:extLst>
+              <a:ext uri="{28A0092B-C50C-407E-A947-70E740481C1C}">
+                <a14:useLocalDpi xmlns:a14="http://schemas.microsoft.com/office/drawing/2010/main" val="0"/>
+              </a:ext>
+            </a:extLst>
+          </a:blip>
+          <a:srcRect/>
+          <a:stretch>
+            <a:fillRect/>
+          </a:stretch>
+        </p:blipFill>
+        <p:spPr bwMode="auto">
+          <a:xfrm>
+            <a:off x="4207110" y="1790290"/>
+            <a:ext cx="644268" cy="706349"/>
           </a:xfrm>
           <a:prstGeom prst="rect">
             <a:avLst/>
           </a:prstGeom>
-          <a:solidFill>
+          <a:noFill/>
+          <a:extLst>
+            <a:ext uri="{909E8E84-426E-40DD-AFC4-6F175D3DCCD1}">
+              <a14:hiddenFill xmlns:a14="http://schemas.microsoft.com/office/drawing/2010/main">
+                <a:solidFill>
+                  <a:srgbClr val="FFFFFF"/>
+                </a:solidFill>
+              </a14:hiddenFill>
+            </a:ext>
+          </a:extLst>
+        </p:spPr>
+      </p:pic>
+      <p:sp>
+        <p:nvSpPr>
+          <p:cNvPr id="34" name="Rounded Rectangle 33"/>
+          <p:cNvSpPr/>
+          <p:nvPr/>
+        </p:nvSpPr>
+        <p:spPr>
+          <a:xfrm>
+            <a:off x="3881244" y="2547602"/>
+            <a:ext cx="1296000" cy="354503"/>
+          </a:xfrm>
+          <a:prstGeom prst="roundRect">
+            <a:avLst/>
+          </a:prstGeom>
+          <a:gradFill flip="none" rotWithShape="1">
+            <a:gsLst>
+              <a:gs pos="0">
+                <a:schemeClr val="accent2">
+                  <a:shade val="30000"/>
+                  <a:satMod val="115000"/>
+                </a:schemeClr>
+              </a:gs>
+              <a:gs pos="50000">
+                <a:schemeClr val="accent2">
+                  <a:shade val="67500"/>
+                  <a:satMod val="115000"/>
+                </a:schemeClr>
+              </a:gs>
+              <a:gs pos="100000">
+                <a:schemeClr val="accent2">
+                  <a:shade val="100000"/>
+                  <a:satMod val="115000"/>
+                </a:schemeClr>
+              </a:gs>
+            </a:gsLst>
+            <a:lin ang="16200000" scaled="1"/>
+            <a:tileRect/>
+          </a:gradFill>
+          <a:ln/>
+        </p:spPr>
+        <p:style>
+          <a:lnRef idx="0">
+            <a:schemeClr val="accent2"/>
+          </a:lnRef>
+          <a:fillRef idx="3">
+            <a:schemeClr val="accent2"/>
+          </a:fillRef>
+          <a:effectRef idx="3">
+            <a:schemeClr val="accent2"/>
+          </a:effectRef>
+          <a:fontRef idx="minor">
+            <a:schemeClr val="lt1"/>
+          </a:fontRef>
+        </p:style>
+        <p:txBody>
+          <a:bodyPr rtlCol="0" anchor="ctr"/>
+          <a:lstStyle/>
+          <a:p>
+            <a:pPr algn="ctr"/>
+            <a:r>
+              <a:rPr lang="en-US" dirty="0" smtClean="0">
+                <a:solidFill>
+                  <a:srgbClr val="000000"/>
+                </a:solidFill>
+              </a:rPr>
+              <a:t>View</a:t>
+            </a:r>
+            <a:endParaRPr lang="en-US" dirty="0">
+              <a:solidFill>
+                <a:srgbClr val="000000"/>
+              </a:solidFill>
+            </a:endParaRPr>
+          </a:p>
+        </p:txBody>
+      </p:sp>
+      <p:cxnSp>
+        <p:nvCxnSpPr>
+          <p:cNvPr id="35" name="Straight Arrow Connector 34"/>
+          <p:cNvCxnSpPr>
+            <a:stCxn id="52" idx="2"/>
+          </p:cNvCxnSpPr>
+          <p:nvPr/>
+        </p:nvCxnSpPr>
+        <p:spPr>
+          <a:xfrm>
+            <a:off x="4532294" y="4608203"/>
+            <a:ext cx="0" cy="460444"/>
+          </a:xfrm>
+          <a:prstGeom prst="straightConnector1">
+            <a:avLst/>
+          </a:prstGeom>
+          <a:ln w="28575">
+            <a:solidFill>
+              <a:schemeClr val="tx1"/>
+            </a:solidFill>
+            <a:prstDash val="sysDash"/>
+            <a:tailEnd type="arrow" w="lg" len="lg"/>
+          </a:ln>
+        </p:spPr>
+        <p:style>
+          <a:lnRef idx="1">
+            <a:schemeClr val="accent1"/>
+          </a:lnRef>
+          <a:fillRef idx="0">
+            <a:schemeClr val="accent1"/>
+          </a:fillRef>
+          <a:effectRef idx="0">
+            <a:schemeClr val="accent1"/>
+          </a:effectRef>
+          <a:fontRef idx="minor">
             <a:schemeClr val="tx1"/>
-          </a:solidFill>
-        </p:spPr>
-        <p:txBody>
-          <a:bodyPr wrap="none" lIns="91440" tIns="45720" rIns="91440" bIns="45720">
-            <a:spAutoFit/>
-          </a:bodyPr>
-          <a:lstStyle/>
-          <a:p>
-            <a:pPr algn="ctr"/>
-            <a:r>
-              <a:rPr lang="en-US" sz="5400" b="1" cap="none" spc="300" dirty="0" smtClean="0">
-                <a:ln w="11430" cmpd="sng">
-                  <a:solidFill>
-                    <a:schemeClr val="accent1">
-                      <a:tint val="10000"/>
-                    </a:schemeClr>
-                  </a:solidFill>
-                  <a:prstDash val="solid"/>
-                  <a:miter lim="800000"/>
-                </a:ln>
-                <a:gradFill>
-                  <a:gsLst>
-                    <a:gs pos="10000">
-                      <a:schemeClr val="accent1">
-                        <a:tint val="83000"/>
-                        <a:shade val="100000"/>
-                        <a:satMod val="200000"/>
-                      </a:schemeClr>
-                    </a:gs>
-                    <a:gs pos="75000">
-                      <a:schemeClr val="accent1">
-                        <a:tint val="100000"/>
-                        <a:shade val="50000"/>
-                        <a:satMod val="150000"/>
-                      </a:schemeClr>
-                    </a:gs>
-                  </a:gsLst>
-                  <a:lin ang="5400000"/>
-                </a:gradFill>
-                <a:effectLst>
-                  <a:glow rad="45500">
-                    <a:schemeClr val="accent1">
-                      <a:satMod val="220000"/>
-                      <a:alpha val="35000"/>
-                    </a:schemeClr>
-                  </a:glow>
-                </a:effectLst>
-              </a:rPr>
-              <a:t>Windows Phone 8</a:t>
-            </a:r>
-            <a:endParaRPr lang="en-US" sz="5400" b="1" cap="none" spc="300" dirty="0">
-              <a:ln w="11430" cmpd="sng">
-                <a:solidFill>
-                  <a:schemeClr val="accent1">
-                    <a:tint val="10000"/>
-                  </a:schemeClr>
-                </a:solidFill>
-                <a:prstDash val="solid"/>
-                <a:miter lim="800000"/>
-              </a:ln>
-              <a:gradFill>
-                <a:gsLst>
-                  <a:gs pos="10000">
-                    <a:schemeClr val="accent1">
-                      <a:tint val="83000"/>
-                      <a:shade val="100000"/>
-                      <a:satMod val="200000"/>
-                    </a:schemeClr>
-                  </a:gs>
-                  <a:gs pos="75000">
-                    <a:schemeClr val="accent1">
-                      <a:tint val="100000"/>
-                      <a:shade val="50000"/>
-                      <a:satMod val="150000"/>
-                    </a:schemeClr>
-                  </a:gs>
-                </a:gsLst>
-                <a:lin ang="5400000"/>
-              </a:gradFill>
-              <a:effectLst>
-                <a:glow rad="45500">
-                  <a:schemeClr val="accent1">
-                    <a:satMod val="220000"/>
-                    <a:alpha val="35000"/>
-                  </a:schemeClr>
-                </a:glow>
-              </a:effectLst>
-            </a:endParaRPr>
-          </a:p>
-        </p:txBody>
-      </p:sp>
+          </a:fontRef>
+        </p:style>
+      </p:cxnSp>
     </p:spTree>
     <p:extLst>
       <p:ext uri="{BB962C8B-B14F-4D97-AF65-F5344CB8AC3E}">
@@ -23749,6 +23846,234 @@
                       </p:childTnLst>
                     </p:cTn>
                   </p:par>
+                  <p:par>
+                    <p:cTn id="48" fill="hold">
+                      <p:stCondLst>
+                        <p:cond delay="indefinite"/>
+                      </p:stCondLst>
+                      <p:childTnLst>
+                        <p:par>
+                          <p:cTn id="49" fill="hold">
+                            <p:stCondLst>
+                              <p:cond delay="0"/>
+                            </p:stCondLst>
+                            <p:childTnLst>
+                              <p:par>
+                                <p:cTn id="50" presetID="10" presetClass="exit" presetSubtype="0" fill="hold" grpId="1" nodeType="clickEffect">
+                                  <p:stCondLst>
+                                    <p:cond delay="0"/>
+                                  </p:stCondLst>
+                                  <p:childTnLst>
+                                    <p:animEffect transition="out" filter="fade">
+                                      <p:cBhvr>
+                                        <p:cTn id="51" dur="500"/>
+                                        <p:tgtEl>
+                                          <p:spTgt spid="25"/>
+                                        </p:tgtEl>
+                                      </p:cBhvr>
+                                    </p:animEffect>
+                                    <p:set>
+                                      <p:cBhvr>
+                                        <p:cTn id="52" dur="1" fill="hold">
+                                          <p:stCondLst>
+                                            <p:cond delay="499"/>
+                                          </p:stCondLst>
+                                        </p:cTn>
+                                        <p:tgtEl>
+                                          <p:spTgt spid="25"/>
+                                        </p:tgtEl>
+                                        <p:attrNameLst>
+                                          <p:attrName>style.visibility</p:attrName>
+                                        </p:attrNameLst>
+                                      </p:cBhvr>
+                                      <p:to>
+                                        <p:strVal val="hidden"/>
+                                      </p:to>
+                                    </p:set>
+                                  </p:childTnLst>
+                                </p:cTn>
+                              </p:par>
+                              <p:par>
+                                <p:cTn id="53" presetID="10" presetClass="exit" presetSubtype="0" fill="hold" grpId="1" nodeType="withEffect">
+                                  <p:stCondLst>
+                                    <p:cond delay="0"/>
+                                  </p:stCondLst>
+                                  <p:childTnLst>
+                                    <p:animEffect transition="out" filter="fade">
+                                      <p:cBhvr>
+                                        <p:cTn id="54" dur="500"/>
+                                        <p:tgtEl>
+                                          <p:spTgt spid="56"/>
+                                        </p:tgtEl>
+                                      </p:cBhvr>
+                                    </p:animEffect>
+                                    <p:set>
+                                      <p:cBhvr>
+                                        <p:cTn id="55" dur="1" fill="hold">
+                                          <p:stCondLst>
+                                            <p:cond delay="499"/>
+                                          </p:stCondLst>
+                                        </p:cTn>
+                                        <p:tgtEl>
+                                          <p:spTgt spid="56"/>
+                                        </p:tgtEl>
+                                        <p:attrNameLst>
+                                          <p:attrName>style.visibility</p:attrName>
+                                        </p:attrNameLst>
+                                      </p:cBhvr>
+                                      <p:to>
+                                        <p:strVal val="hidden"/>
+                                      </p:to>
+                                    </p:set>
+                                  </p:childTnLst>
+                                </p:cTn>
+                              </p:par>
+                              <p:par>
+                                <p:cTn id="56" presetID="10" presetClass="entr" presetSubtype="0" fill="hold" grpId="0" nodeType="withEffect">
+                                  <p:stCondLst>
+                                    <p:cond delay="0"/>
+                                  </p:stCondLst>
+                                  <p:childTnLst>
+                                    <p:set>
+                                      <p:cBhvr>
+                                        <p:cTn id="57" dur="1" fill="hold">
+                                          <p:stCondLst>
+                                            <p:cond delay="0"/>
+                                          </p:stCondLst>
+                                        </p:cTn>
+                                        <p:tgtEl>
+                                          <p:spTgt spid="33"/>
+                                        </p:tgtEl>
+                                        <p:attrNameLst>
+                                          <p:attrName>style.visibility</p:attrName>
+                                        </p:attrNameLst>
+                                      </p:cBhvr>
+                                      <p:to>
+                                        <p:strVal val="visible"/>
+                                      </p:to>
+                                    </p:set>
+                                    <p:animEffect transition="in" filter="fade">
+                                      <p:cBhvr>
+                                        <p:cTn id="58" dur="500"/>
+                                        <p:tgtEl>
+                                          <p:spTgt spid="33"/>
+                                        </p:tgtEl>
+                                      </p:cBhvr>
+                                    </p:animEffect>
+                                  </p:childTnLst>
+                                </p:cTn>
+                              </p:par>
+                              <p:par>
+                                <p:cTn id="59" presetID="10" presetClass="entr" presetSubtype="0" fill="hold" grpId="0" nodeType="withEffect">
+                                  <p:stCondLst>
+                                    <p:cond delay="0"/>
+                                  </p:stCondLst>
+                                  <p:childTnLst>
+                                    <p:set>
+                                      <p:cBhvr>
+                                        <p:cTn id="60" dur="1" fill="hold">
+                                          <p:stCondLst>
+                                            <p:cond delay="0"/>
+                                          </p:stCondLst>
+                                        </p:cTn>
+                                        <p:tgtEl>
+                                          <p:spTgt spid="34"/>
+                                        </p:tgtEl>
+                                        <p:attrNameLst>
+                                          <p:attrName>style.visibility</p:attrName>
+                                        </p:attrNameLst>
+                                      </p:cBhvr>
+                                      <p:to>
+                                        <p:strVal val="visible"/>
+                                      </p:to>
+                                    </p:set>
+                                    <p:animEffect transition="in" filter="fade">
+                                      <p:cBhvr>
+                                        <p:cTn id="61" dur="500"/>
+                                        <p:tgtEl>
+                                          <p:spTgt spid="34"/>
+                                        </p:tgtEl>
+                                      </p:cBhvr>
+                                    </p:animEffect>
+                                  </p:childTnLst>
+                                </p:cTn>
+                              </p:par>
+                              <p:par>
+                                <p:cTn id="62" presetID="10" presetClass="entr" presetSubtype="0" fill="hold" nodeType="withEffect">
+                                  <p:stCondLst>
+                                    <p:cond delay="0"/>
+                                  </p:stCondLst>
+                                  <p:childTnLst>
+                                    <p:set>
+                                      <p:cBhvr>
+                                        <p:cTn id="63" dur="1" fill="hold">
+                                          <p:stCondLst>
+                                            <p:cond delay="0"/>
+                                          </p:stCondLst>
+                                        </p:cTn>
+                                        <p:tgtEl>
+                                          <p:spTgt spid="1026"/>
+                                        </p:tgtEl>
+                                        <p:attrNameLst>
+                                          <p:attrName>style.visibility</p:attrName>
+                                        </p:attrNameLst>
+                                      </p:cBhvr>
+                                      <p:to>
+                                        <p:strVal val="visible"/>
+                                      </p:to>
+                                    </p:set>
+                                    <p:animEffect transition="in" filter="fade">
+                                      <p:cBhvr>
+                                        <p:cTn id="64" dur="500"/>
+                                        <p:tgtEl>
+                                          <p:spTgt spid="1026"/>
+                                        </p:tgtEl>
+                                      </p:cBhvr>
+                                    </p:animEffect>
+                                  </p:childTnLst>
+                                </p:cTn>
+                              </p:par>
+                              <p:par>
+                                <p:cTn id="65" presetID="10" presetClass="entr" presetSubtype="0" fill="hold" nodeType="withEffect">
+                                  <p:stCondLst>
+                                    <p:cond delay="0"/>
+                                  </p:stCondLst>
+                                  <p:childTnLst>
+                                    <p:set>
+                                      <p:cBhvr>
+                                        <p:cTn id="66" dur="1" fill="hold">
+                                          <p:stCondLst>
+                                            <p:cond delay="0"/>
+                                          </p:stCondLst>
+                                        </p:cTn>
+                                        <p:tgtEl>
+                                          <p:spTgt spid="35"/>
+                                        </p:tgtEl>
+                                        <p:attrNameLst>
+                                          <p:attrName>style.visibility</p:attrName>
+                                        </p:attrNameLst>
+                                      </p:cBhvr>
+                                      <p:to>
+                                        <p:strVal val="visible"/>
+                                      </p:to>
+                                    </p:set>
+                                    <p:animEffect transition="in" filter="fade">
+                                      <p:cBhvr>
+                                        <p:cTn id="67" dur="500"/>
+                                        <p:tgtEl>
+                                          <p:spTgt spid="35"/>
+                                        </p:tgtEl>
+                                      </p:cBhvr>
+                                    </p:animEffect>
+                                  </p:childTnLst>
+                                </p:cTn>
+                              </p:par>
+                            </p:childTnLst>
+                          </p:cTn>
+                        </p:par>
+                      </p:childTnLst>
+                    </p:cTn>
+                  </p:par>
                 </p:childTnLst>
               </p:cTn>
               <p:prevCondLst>
@@ -23771,6 +24096,7 @@
       </p:par>
     </p:tnLst>
     <p:bldLst>
+      <p:bldP spid="33" grpId="0" animBg="1"/>
       <p:bldP spid="40" grpId="0" animBg="1"/>
       <p:bldP spid="60" grpId="0" animBg="1"/>
       <p:bldP spid="42" grpId="0" animBg="1"/>
@@ -23781,9 +24107,12 @@
       <p:bldP spid="51" grpId="0" animBg="1"/>
       <p:bldP spid="53" grpId="0" animBg="1"/>
       <p:bldP spid="25" grpId="0"/>
+      <p:bldP spid="25" grpId="1"/>
       <p:bldP spid="56" grpId="0"/>
+      <p:bldP spid="56" grpId="1"/>
       <p:bldP spid="57" grpId="0" animBg="1"/>
       <p:bldP spid="52" grpId="0" animBg="1"/>
+      <p:bldP spid="34" grpId="0" animBg="1"/>
     </p:bldLst>
   </p:timing>
 </p:sld>

</xml_diff>

<commit_message>
Image with source in slides
</commit_message>
<xml_diff>
--- a/docs/13-09-26 Cross-platform mobile development with C#.pptx
+++ b/docs/13-09-26 Cross-platform mobile development with C#.pptx
@@ -45,20 +45,20 @@
   <p:notesSz cx="6858000" cy="9144000"/>
   <p:embeddedFontLst>
     <p:embeddedFont>
-      <p:font typeface="AA Zuehlke Medium" panose="02000603060000020004" pitchFamily="2" charset="0"/>
+      <p:font typeface="AA Zuehlke" panose="02000503060000020004" pitchFamily="2" charset="0"/>
       <p:regular r:id="rId33"/>
+      <p:bold r:id="rId34"/>
     </p:embeddedFont>
     <p:embeddedFont>
       <p:font typeface="Webdings" panose="05030102010509060703" pitchFamily="18" charset="2"/>
-      <p:regular r:id="rId34"/>
-    </p:embeddedFont>
-    <p:embeddedFont>
-      <p:font typeface="AA Zuehlke" panose="02000503060000020004" pitchFamily="2" charset="0"/>
       <p:regular r:id="rId35"/>
-      <p:bold r:id="rId36"/>
     </p:embeddedFont>
     <p:embeddedFont>
       <p:font typeface="Wingdings 3" panose="05040102010807070707" pitchFamily="18" charset="2"/>
+      <p:regular r:id="rId36"/>
+    </p:embeddedFont>
+    <p:embeddedFont>
+      <p:font typeface="AA Zuehlke Medium" panose="02000603060000020004" pitchFamily="2" charset="0"/>
       <p:regular r:id="rId37"/>
     </p:embeddedFont>
   </p:embeddedFontLst>
@@ -731,7 +731,7 @@
               <a:rPr lang="de-DE" smtClean="0">
                 <a:latin typeface="AA Zuehlke" pitchFamily="2" charset="0"/>
               </a:rPr>
-              <a:t>20.09.2013</a:t>
+              <a:t>21.09.2013</a:t>
             </a:fld>
             <a:endParaRPr lang="de-DE">
               <a:latin typeface="AA Zuehlke" pitchFamily="2" charset="0"/>
@@ -909,7 +909,7 @@
             <a:fld id="{A6966AE6-B72D-4967-9CA3-8469D2863705}" type="datetimeFigureOut">
               <a:rPr lang="en-US" smtClean="0"/>
               <a:pPr/>
-              <a:t>9/20/2013</a:t>
+              <a:t>9/21/2013</a:t>
             </a:fld>
             <a:endParaRPr lang="en-US" dirty="0"/>
           </a:p>
@@ -11034,47 +11034,6 @@
       </p:sp>
       <p:pic>
         <p:nvPicPr>
-          <p:cNvPr id="2050" name="Picture 2" descr="http://cdn.itproportal.com/photos/Whatsapp-Android-Chats_original.jpg"/>
-          <p:cNvPicPr>
-            <a:picLocks noChangeAspect="1" noChangeArrowheads="1"/>
-          </p:cNvPicPr>
-          <p:nvPr/>
-        </p:nvPicPr>
-        <p:blipFill>
-          <a:blip r:embed="rId3" cstate="print">
-            <a:extLst>
-              <a:ext uri="{28A0092B-C50C-407E-A947-70E740481C1C}">
-                <a14:useLocalDpi xmlns:a14="http://schemas.microsoft.com/office/drawing/2010/main" val="0"/>
-              </a:ext>
-            </a:extLst>
-          </a:blip>
-          <a:srcRect/>
-          <a:stretch>
-            <a:fillRect/>
-          </a:stretch>
-        </p:blipFill>
-        <p:spPr bwMode="auto">
-          <a:xfrm>
-            <a:off x="5120063" y="1699075"/>
-            <a:ext cx="2659942" cy="4781053"/>
-          </a:xfrm>
-          <a:prstGeom prst="rect">
-            <a:avLst/>
-          </a:prstGeom>
-          <a:noFill/>
-          <a:extLst>
-            <a:ext uri="{909E8E84-426E-40DD-AFC4-6F175D3DCCD1}">
-              <a14:hiddenFill xmlns:a14="http://schemas.microsoft.com/office/drawing/2010/main">
-                <a:solidFill>
-                  <a:srgbClr val="FFFFFF"/>
-                </a:solidFill>
-              </a14:hiddenFill>
-            </a:ext>
-          </a:extLst>
-        </p:spPr>
-      </p:pic>
-      <p:pic>
-        <p:nvPicPr>
           <p:cNvPr id="11" name="Logo" descr="C:\Users\Luc Benninger\Desktop\Zuehlke_Logo_rgb_300dpi.png"/>
           <p:cNvPicPr>
             <a:picLocks noChangeArrowheads="1"/>
@@ -11086,7 +11045,7 @@
           </p:nvPr>
         </p:nvPicPr>
         <p:blipFill>
-          <a:blip r:embed="rId4" cstate="print">
+          <a:blip r:embed="rId3" cstate="print">
             <a:extLst>
               <a:ext uri="{28A0092B-C50C-407E-A947-70E740481C1C}">
                 <a14:useLocalDpi xmlns:a14="http://schemas.microsoft.com/office/drawing/2010/main" val="0"/>
@@ -11165,6 +11124,90 @@
               <a:t>17</a:t>
             </a:fld>
             <a:endParaRPr lang="de-CH" dirty="0"/>
+          </a:p>
+        </p:txBody>
+      </p:sp>
+      <p:pic>
+        <p:nvPicPr>
+          <p:cNvPr id="1026" name="Picture 2" descr="http://fc09.deviantart.net/fs71/i/2012/140/6/8/tweetbot_skin_for_whatsapp_messenger_by_nachomaster-d50f2fl.png"/>
+          <p:cNvPicPr>
+            <a:picLocks noChangeAspect="1" noChangeArrowheads="1"/>
+          </p:cNvPicPr>
+          <p:nvPr/>
+        </p:nvPicPr>
+        <p:blipFill rotWithShape="1">
+          <a:blip r:embed="rId4" cstate="print">
+            <a:extLst>
+              <a:ext uri="{28A0092B-C50C-407E-A947-70E740481C1C}">
+                <a14:useLocalDpi xmlns:a14="http://schemas.microsoft.com/office/drawing/2010/main" val="0"/>
+              </a:ext>
+            </a:extLst>
+          </a:blip>
+          <a:srcRect l="317" t="1708" r="46824" b="7941"/>
+          <a:stretch/>
+        </p:blipFill>
+        <p:spPr bwMode="auto">
+          <a:xfrm>
+            <a:off x="3886200" y="1524000"/>
+            <a:ext cx="4098349" cy="5041716"/>
+          </a:xfrm>
+          <a:prstGeom prst="rect">
+            <a:avLst/>
+          </a:prstGeom>
+          <a:noFill/>
+          <a:extLst>
+            <a:ext uri="{909E8E84-426E-40DD-AFC4-6F175D3DCCD1}">
+              <a14:hiddenFill xmlns:a14="http://schemas.microsoft.com/office/drawing/2010/main">
+                <a:solidFill>
+                  <a:srgbClr val="FFFFFF"/>
+                </a:solidFill>
+              </a14:hiddenFill>
+            </a:ext>
+          </a:extLst>
+        </p:spPr>
+      </p:pic>
+      <p:sp>
+        <p:nvSpPr>
+          <p:cNvPr id="4" name="TextBox 3"/>
+          <p:cNvSpPr txBox="1"/>
+          <p:nvPr/>
+        </p:nvSpPr>
+        <p:spPr>
+          <a:xfrm rot="16200000">
+            <a:off x="6318673" y="3866636"/>
+            <a:ext cx="3136900" cy="356445"/>
+          </a:xfrm>
+          <a:prstGeom prst="rect">
+            <a:avLst/>
+          </a:prstGeom>
+          <a:noFill/>
+        </p:spPr>
+        <p:txBody>
+          <a:bodyPr wrap="none" rtlCol="0">
+            <a:noAutofit/>
+          </a:bodyPr>
+          <a:lstStyle/>
+          <a:p>
+            <a:pPr algn="ctr"/>
+            <a:r>
+              <a:rPr lang="en-US" sz="800" dirty="0" smtClean="0">
+                <a:solidFill>
+                  <a:schemeClr val="bg1">
+                    <a:lumMod val="50000"/>
+                  </a:schemeClr>
+                </a:solidFill>
+                <a:latin typeface="AA Zuehlke" pitchFamily="2" charset="0"/>
+              </a:rPr>
+              <a:t>deviantart.com/art/Tweetbot-Skin-for-WhatsApp-Messenger-303033873</a:t>
+            </a:r>
+            <a:endParaRPr lang="en-US" sz="800" dirty="0" smtClean="0">
+              <a:solidFill>
+                <a:schemeClr val="bg1">
+                  <a:lumMod val="50000"/>
+                </a:schemeClr>
+              </a:solidFill>
+              <a:latin typeface="AA Zuehlke" pitchFamily="2" charset="0"/>
+            </a:endParaRPr>
           </a:p>
         </p:txBody>
       </p:sp>
@@ -18409,11 +18452,7 @@
             </a:pPr>
             <a:r>
               <a:rPr lang="en-US" dirty="0" smtClean="0"/>
-              <a:t>Questions			</a:t>
-            </a:r>
-            <a:r>
-              <a:rPr lang="en-US" dirty="0" smtClean="0"/>
-              <a:t>			  </a:t>
+              <a:t>Questions						  </a:t>
             </a:r>
             <a:r>
               <a:rPr lang="en-US" dirty="0" smtClean="0">
@@ -20394,9 +20433,6 @@
               </a:rPr>
               <a:t>64 %</a:t>
             </a:r>
-            <a:endParaRPr lang="en-US" sz="2200" dirty="0" smtClean="0">
-              <a:latin typeface="AA Zuehlke" pitchFamily="2" charset="0"/>
-            </a:endParaRPr>
           </a:p>
         </p:txBody>
       </p:sp>
@@ -21607,9 +21643,6 @@
               </a:rPr>
               <a:t>36 %</a:t>
             </a:r>
-            <a:endParaRPr lang="en-US" sz="2200" dirty="0" smtClean="0">
-              <a:latin typeface="AA Zuehlke" pitchFamily="2" charset="0"/>
-            </a:endParaRPr>
           </a:p>
         </p:txBody>
       </p:sp>
@@ -24925,9 +24958,6 @@
               </a:rPr>
               <a:t>Product Owner</a:t>
             </a:r>
-            <a:endParaRPr lang="en-US" sz="2200" dirty="0" smtClean="0">
-              <a:latin typeface="AA Zuehlke" pitchFamily="2" charset="0"/>
-            </a:endParaRPr>
           </a:p>
         </p:txBody>
       </p:sp>
@@ -25160,11 +25190,7 @@
             </a:r>
             <a:r>
               <a:rPr lang="en-US" sz="2800" dirty="0" smtClean="0"/>
-              <a:t> </a:t>
-            </a:r>
-            <a:r>
-              <a:rPr lang="en-US" sz="2800" dirty="0" smtClean="0"/>
-              <a:t>API</a:t>
+              <a:t> API</a:t>
             </a:r>
           </a:p>
           <a:p>

</xml_diff>

<commit_message>
Slides updated after test run
</commit_message>
<xml_diff>
--- a/docs/13-09-26 Cross-platform mobile development with C#.pptx
+++ b/docs/13-09-26 Cross-platform mobile development with C#.pptx
@@ -5,10 +5,10 @@
     <p:sldMasterId id="2147483648" r:id="rId1"/>
   </p:sldMasterIdLst>
   <p:notesMasterIdLst>
-    <p:notesMasterId r:id="rId31"/>
+    <p:notesMasterId r:id="rId32"/>
   </p:notesMasterIdLst>
   <p:handoutMasterIdLst>
-    <p:handoutMasterId r:id="rId32"/>
+    <p:handoutMasterId r:id="rId33"/>
   </p:handoutMasterIdLst>
   <p:sldIdLst>
     <p:sldId id="293" r:id="rId2"/>
@@ -34,36 +34,37 @@
     <p:sldId id="320" r:id="rId22"/>
     <p:sldId id="322" r:id="rId23"/>
     <p:sldId id="304" r:id="rId24"/>
-    <p:sldId id="323" r:id="rId25"/>
-    <p:sldId id="290" r:id="rId26"/>
-    <p:sldId id="298" r:id="rId27"/>
-    <p:sldId id="299" r:id="rId28"/>
-    <p:sldId id="297" r:id="rId29"/>
-    <p:sldId id="295" r:id="rId30"/>
+    <p:sldId id="324" r:id="rId25"/>
+    <p:sldId id="323" r:id="rId26"/>
+    <p:sldId id="290" r:id="rId27"/>
+    <p:sldId id="298" r:id="rId28"/>
+    <p:sldId id="299" r:id="rId29"/>
+    <p:sldId id="297" r:id="rId30"/>
+    <p:sldId id="295" r:id="rId31"/>
   </p:sldIdLst>
   <p:sldSz cx="9144000" cy="6858000" type="screen4x3"/>
   <p:notesSz cx="6858000" cy="9144000"/>
   <p:embeddedFontLst>
     <p:embeddedFont>
       <p:font typeface="AA Zuehlke Medium" panose="02000603060000020004" pitchFamily="2" charset="0"/>
-      <p:regular r:id="rId33"/>
+      <p:regular r:id="rId34"/>
+    </p:embeddedFont>
+    <p:embeddedFont>
+      <p:font typeface="AA Zuehlke" panose="02000503060000020004" pitchFamily="2" charset="0"/>
+      <p:regular r:id="rId35"/>
+      <p:bold r:id="rId36"/>
     </p:embeddedFont>
     <p:embeddedFont>
       <p:font typeface="Webdings" panose="05030102010509060703" pitchFamily="18" charset="2"/>
-      <p:regular r:id="rId34"/>
+      <p:regular r:id="rId37"/>
     </p:embeddedFont>
     <p:embeddedFont>
       <p:font typeface="Wingdings 3" panose="05040102010807070707" pitchFamily="18" charset="2"/>
-      <p:regular r:id="rId35"/>
-    </p:embeddedFont>
-    <p:embeddedFont>
-      <p:font typeface="AA Zuehlke" panose="02000503060000020004" pitchFamily="2" charset="0"/>
-      <p:regular r:id="rId36"/>
-      <p:bold r:id="rId37"/>
+      <p:regular r:id="rId38"/>
     </p:embeddedFont>
   </p:embeddedFontLst>
   <p:custDataLst>
-    <p:tags r:id="rId38"/>
+    <p:tags r:id="rId39"/>
   </p:custDataLst>
   <p:defaultTextStyle>
     <a:defPPr>
@@ -622,6 +623,7 @@
     </c:plotArea>
     <c:legend>
       <c:legendPos val="t"/>
+      <c:layout/>
       <c:overlay val="0"/>
     </c:legend>
     <c:plotVisOnly val="1"/>
@@ -1413,7 +1415,7 @@
             <a:fld id="{04E102C5-3B9C-48EE-BFF0-2E7AF2F2A1F4}" type="slidenum">
               <a:rPr lang="en-US" smtClean="0"/>
               <a:pPr/>
-              <a:t>24</a:t>
+              <a:t>25</a:t>
             </a:fld>
             <a:endParaRPr lang="en-US" dirty="0"/>
           </a:p>
@@ -1678,7 +1680,7 @@
             <a:fld id="{04E102C5-3B9C-48EE-BFF0-2E7AF2F2A1F4}" type="slidenum">
               <a:rPr lang="en-US" smtClean="0"/>
               <a:pPr/>
-              <a:t>27</a:t>
+              <a:t>28</a:t>
             </a:fld>
             <a:endParaRPr lang="en-US" dirty="0"/>
           </a:p>
@@ -10509,8 +10511,13 @@
             <a:pPr lvl="1"/>
             <a:r>
               <a:rPr lang="en-US" sz="2800" dirty="0" smtClean="0"/>
-              <a:t>Navigation is also defined in the shared part</a:t>
-            </a:r>
+              <a:t>Navigation is also defined in the shared </a:t>
+            </a:r>
+            <a:r>
+              <a:rPr lang="en-US" sz="2800" dirty="0" smtClean="0"/>
+              <a:t>part!</a:t>
+            </a:r>
+            <a:endParaRPr lang="en-US" sz="2800" dirty="0" smtClean="0"/>
           </a:p>
           <a:p>
             <a:endParaRPr lang="en-US" sz="2800" dirty="0" smtClean="0"/>
@@ -10529,7 +10536,11 @@
             </a:r>
             <a:r>
               <a:rPr lang="en-US" sz="2800" dirty="0" smtClean="0"/>
-              <a:t> (i.e. browser window)</a:t>
+              <a:t> (i.e. </a:t>
+            </a:r>
+            <a:r>
+              <a:rPr lang="en-US" sz="2800" dirty="0" smtClean="0"/>
+              <a:t>embedded browser)</a:t>
             </a:r>
             <a:endParaRPr lang="en-US" sz="2800" dirty="0"/>
           </a:p>
@@ -11427,11 +11438,23 @@
             <a:pPr lvl="1"/>
             <a:r>
               <a:rPr lang="en-US" dirty="0" err="1" smtClean="0"/>
-              <a:t>ICommand</a:t>
+              <a:t>ICommands</a:t>
             </a:r>
             <a:r>
               <a:rPr lang="en-US" dirty="0" smtClean="0"/>
-              <a:t> to load/reload messages</a:t>
+              <a:t> </a:t>
+            </a:r>
+            <a:r>
+              <a:rPr lang="en-US" dirty="0" smtClean="0"/>
+              <a:t>to </a:t>
+            </a:r>
+            <a:r>
+              <a:rPr lang="en-US" dirty="0" smtClean="0"/>
+              <a:t>load and compose </a:t>
+            </a:r>
+            <a:r>
+              <a:rPr lang="en-US" dirty="0" smtClean="0"/>
+              <a:t>messages</a:t>
             </a:r>
           </a:p>
           <a:p>
@@ -15881,15 +15904,11 @@
             <a:pPr lvl="1"/>
             <a:r>
               <a:rPr lang="en-US" dirty="0" smtClean="0"/>
-              <a:t>Create </a:t>
-            </a:r>
-            <a:r>
-              <a:rPr lang="en-US" dirty="0" err="1" smtClean="0"/>
-              <a:t>DatabaseService</a:t>
+              <a:t>Service </a:t>
             </a:r>
             <a:r>
               <a:rPr lang="en-US" dirty="0" smtClean="0"/>
-              <a:t> (client-side) to access database</a:t>
+              <a:t>(client-side) to access database</a:t>
             </a:r>
           </a:p>
           <a:p>
@@ -16179,6 +16198,341 @@
       </p:grpSpPr>
       <p:sp>
         <p:nvSpPr>
+          <p:cNvPr id="8" name="Rectangle 7"/>
+          <p:cNvSpPr/>
+          <p:nvPr/>
+        </p:nvSpPr>
+        <p:spPr>
+          <a:xfrm>
+            <a:off x="0" y="0"/>
+            <a:ext cx="9144000" cy="1524000"/>
+          </a:xfrm>
+          <a:prstGeom prst="rect">
+            <a:avLst/>
+          </a:prstGeom>
+          <a:solidFill>
+            <a:srgbClr val="FF820A"/>
+          </a:solidFill>
+          <a:ln w="12700">
+            <a:noFill/>
+          </a:ln>
+        </p:spPr>
+        <p:style>
+          <a:lnRef idx="2">
+            <a:schemeClr val="accent1">
+              <a:shade val="50000"/>
+            </a:schemeClr>
+          </a:lnRef>
+          <a:fillRef idx="1">
+            <a:schemeClr val="accent1"/>
+          </a:fillRef>
+          <a:effectRef idx="0">
+            <a:schemeClr val="accent1"/>
+          </a:effectRef>
+          <a:fontRef idx="minor">
+            <a:schemeClr val="lt1"/>
+          </a:fontRef>
+        </p:style>
+        <p:txBody>
+          <a:bodyPr rtlCol="0" anchor="ctr"/>
+          <a:lstStyle/>
+          <a:p>
+            <a:pPr algn="ctr"/>
+            <a:endParaRPr lang="en-US" sz="2200" dirty="0" err="1" smtClean="0">
+              <a:latin typeface="AA Zuehlke" pitchFamily="2" charset="0"/>
+            </a:endParaRPr>
+          </a:p>
+        </p:txBody>
+      </p:sp>
+      <p:sp>
+        <p:nvSpPr>
+          <p:cNvPr id="2" name="Content Placeholder 1"/>
+          <p:cNvSpPr>
+            <a:spLocks noGrp="1"/>
+          </p:cNvSpPr>
+          <p:nvPr>
+            <p:ph idx="1"/>
+          </p:nvPr>
+        </p:nvSpPr>
+        <p:spPr/>
+        <p:txBody>
+          <a:bodyPr/>
+          <a:lstStyle/>
+          <a:p>
+            <a:r>
+              <a:rPr lang="en-US" sz="2800" dirty="0" smtClean="0"/>
+              <a:t>When to use </a:t>
+            </a:r>
+            <a:r>
+              <a:rPr lang="en-US" sz="2800" dirty="0" err="1" smtClean="0"/>
+              <a:t>Xamarin</a:t>
+            </a:r>
+            <a:r>
+              <a:rPr lang="en-US" sz="2800" dirty="0" smtClean="0"/>
+              <a:t> and </a:t>
+            </a:r>
+            <a:r>
+              <a:rPr lang="en-US" sz="2800" dirty="0" err="1" smtClean="0"/>
+              <a:t>MvvmCross</a:t>
+            </a:r>
+            <a:endParaRPr lang="en-US" sz="2800" dirty="0" smtClean="0"/>
+          </a:p>
+          <a:p>
+            <a:pPr lvl="1"/>
+            <a:r>
+              <a:rPr lang="en-US" sz="2800" dirty="0" smtClean="0"/>
+              <a:t>.NET development team</a:t>
+            </a:r>
+            <a:br>
+              <a:rPr lang="en-US" sz="2800" dirty="0" smtClean="0"/>
+            </a:br>
+            <a:r>
+              <a:rPr lang="en-US" sz="2800" dirty="0" smtClean="0"/>
+              <a:t>(C# as common language)</a:t>
+            </a:r>
+          </a:p>
+          <a:p>
+            <a:pPr lvl="1"/>
+            <a:r>
+              <a:rPr lang="en-US" sz="2800" dirty="0" smtClean="0"/>
+              <a:t>Code sharing</a:t>
+            </a:r>
+          </a:p>
+          <a:p>
+            <a:pPr lvl="1"/>
+            <a:r>
+              <a:rPr lang="en-US" sz="2800" dirty="0" smtClean="0"/>
+              <a:t>Architecture framework:</a:t>
+            </a:r>
+            <a:br>
+              <a:rPr lang="en-US" sz="2800" dirty="0" smtClean="0"/>
+            </a:br>
+            <a:r>
+              <a:rPr lang="en-US" sz="2800" dirty="0" err="1" smtClean="0"/>
+              <a:t>IoC</a:t>
+            </a:r>
+            <a:r>
+              <a:rPr lang="en-US" sz="2800" dirty="0" smtClean="0"/>
+              <a:t>, plug-in system, data binding</a:t>
+            </a:r>
+          </a:p>
+          <a:p>
+            <a:pPr lvl="1"/>
+            <a:r>
+              <a:rPr lang="en-US" sz="2800" dirty="0" smtClean="0"/>
+              <a:t>Use your proven environment and libraries:</a:t>
+            </a:r>
+            <a:br>
+              <a:rPr lang="en-US" sz="2800" dirty="0" smtClean="0"/>
+            </a:br>
+            <a:r>
+              <a:rPr lang="en-US" sz="2800" dirty="0" err="1" smtClean="0"/>
+              <a:t>NUnit</a:t>
+            </a:r>
+            <a:r>
+              <a:rPr lang="en-US" sz="2800" dirty="0" smtClean="0"/>
+              <a:t>, </a:t>
+            </a:r>
+            <a:r>
+              <a:rPr lang="en-US" sz="2800" dirty="0" err="1" smtClean="0"/>
+              <a:t>NSubstitute</a:t>
+            </a:r>
+            <a:r>
+              <a:rPr lang="en-US" sz="2800" dirty="0" smtClean="0"/>
+              <a:t>, Bouncy Castle, CI server</a:t>
+            </a:r>
+            <a:endParaRPr lang="en-US" sz="2800" dirty="0"/>
+          </a:p>
+        </p:txBody>
+      </p:sp>
+      <p:sp>
+        <p:nvSpPr>
+          <p:cNvPr id="3" name="Title 2"/>
+          <p:cNvSpPr>
+            <a:spLocks noGrp="1"/>
+          </p:cNvSpPr>
+          <p:nvPr>
+            <p:ph type="title"/>
+          </p:nvPr>
+        </p:nvSpPr>
+        <p:spPr/>
+        <p:txBody>
+          <a:bodyPr/>
+          <a:lstStyle/>
+          <a:p>
+            <a:r>
+              <a:rPr lang="en-US" dirty="0" err="1" smtClean="0">
+                <a:solidFill>
+                  <a:schemeClr val="bg1"/>
+                </a:solidFill>
+              </a:rPr>
+              <a:t>Learnings</a:t>
+            </a:r>
+            <a:endParaRPr lang="en-US" dirty="0">
+              <a:solidFill>
+                <a:schemeClr val="bg1"/>
+              </a:solidFill>
+            </a:endParaRPr>
+          </a:p>
+        </p:txBody>
+      </p:sp>
+      <p:sp>
+        <p:nvSpPr>
+          <p:cNvPr id="4" name="Date Placeholder 3"/>
+          <p:cNvSpPr>
+            <a:spLocks noGrp="1"/>
+          </p:cNvSpPr>
+          <p:nvPr>
+            <p:ph type="dt" sz="half" idx="10"/>
+          </p:nvPr>
+        </p:nvSpPr>
+        <p:spPr/>
+        <p:txBody>
+          <a:bodyPr/>
+          <a:lstStyle/>
+          <a:p>
+            <a:r>
+              <a:rPr lang="en-US" smtClean="0"/>
+              <a:t>26. September 2013</a:t>
+            </a:r>
+            <a:endParaRPr lang="de-CH" dirty="0"/>
+          </a:p>
+        </p:txBody>
+      </p:sp>
+      <p:sp>
+        <p:nvSpPr>
+          <p:cNvPr id="5" name="Footer Placeholder 4"/>
+          <p:cNvSpPr>
+            <a:spLocks noGrp="1"/>
+          </p:cNvSpPr>
+          <p:nvPr>
+            <p:ph type="ftr" sz="quarter" idx="11"/>
+          </p:nvPr>
+        </p:nvSpPr>
+        <p:spPr/>
+        <p:txBody>
+          <a:bodyPr/>
+          <a:lstStyle/>
+          <a:p>
+            <a:r>
+              <a:rPr lang="en-US" smtClean="0"/>
+              <a:t>Cross-platform Mobile Development | Ursin Brunner, Stefan Schöb, Oliver Brack</a:t>
+            </a:r>
+            <a:endParaRPr lang="de-CH" dirty="0"/>
+          </a:p>
+        </p:txBody>
+      </p:sp>
+      <p:sp>
+        <p:nvSpPr>
+          <p:cNvPr id="7" name="Slide Number Placeholder 6"/>
+          <p:cNvSpPr>
+            <a:spLocks noGrp="1"/>
+          </p:cNvSpPr>
+          <p:nvPr>
+            <p:ph type="sldNum" sz="quarter" idx="12"/>
+          </p:nvPr>
+        </p:nvSpPr>
+        <p:spPr/>
+        <p:txBody>
+          <a:bodyPr/>
+          <a:lstStyle/>
+          <a:p>
+            <a:r>
+              <a:rPr lang="de-CH" smtClean="0"/>
+              <a:t>Slide </a:t>
+            </a:r>
+            <a:fld id="{76AE5747-D0E7-4D66-8FBF-9CFC53A4E0C8}" type="slidenum">
+              <a:rPr lang="de-CH" smtClean="0"/>
+              <a:t>24</a:t>
+            </a:fld>
+            <a:endParaRPr lang="de-CH" dirty="0"/>
+          </a:p>
+        </p:txBody>
+      </p:sp>
+      <p:pic>
+        <p:nvPicPr>
+          <p:cNvPr id="9" name="Logo" descr="C:\Users\Luc Benninger\Desktop\Zuehlke_Logo_rgb_300dpi.png"/>
+          <p:cNvPicPr>
+            <a:picLocks noChangeArrowheads="1"/>
+          </p:cNvPicPr>
+          <p:nvPr>
+            <p:custDataLst>
+              <p:tags r:id="rId1"/>
+            </p:custDataLst>
+          </p:nvPr>
+        </p:nvPicPr>
+        <p:blipFill>
+          <a:blip r:embed="rId3" cstate="print">
+            <a:extLst>
+              <a:ext uri="{28A0092B-C50C-407E-A947-70E740481C1C}">
+                <a14:useLocalDpi xmlns:a14="http://schemas.microsoft.com/office/drawing/2010/main" val="0"/>
+              </a:ext>
+            </a:extLst>
+          </a:blip>
+          <a:srcRect/>
+          <a:stretch>
+            <a:fillRect/>
+          </a:stretch>
+        </p:blipFill>
+        <p:spPr bwMode="auto">
+          <a:xfrm>
+            <a:off x="6567488" y="292100"/>
+            <a:ext cx="1141412" cy="1141412"/>
+          </a:xfrm>
+          <a:prstGeom prst="rect">
+            <a:avLst/>
+          </a:prstGeom>
+          <a:noFill/>
+          <a:extLst>
+            <a:ext uri="{909E8E84-426E-40DD-AFC4-6F175D3DCCD1}">
+              <a14:hiddenFill xmlns:a14="http://schemas.microsoft.com/office/drawing/2010/main">
+                <a:solidFill>
+                  <a:srgbClr val="FFFFFF"/>
+                </a:solidFill>
+              </a14:hiddenFill>
+            </a:ext>
+          </a:extLst>
+        </p:spPr>
+      </p:pic>
+    </p:spTree>
+    <p:extLst>
+      <p:ext uri="{BB962C8B-B14F-4D97-AF65-F5344CB8AC3E}">
+        <p14:creationId xmlns:p14="http://schemas.microsoft.com/office/powerpoint/2010/main" val="1915694857"/>
+      </p:ext>
+    </p:extLst>
+  </p:cSld>
+  <p:clrMapOvr>
+    <a:masterClrMapping/>
+  </p:clrMapOvr>
+  <p:timing>
+    <p:tnLst>
+      <p:par>
+        <p:cTn id="1" dur="indefinite" restart="never" nodeType="tmRoot"/>
+      </p:par>
+    </p:tnLst>
+  </p:timing>
+</p:sld>
+</file>
+
+<file path=ppt/slides/slide25.xml><?xml version="1.0" encoding="utf-8"?>
+<p:sld xmlns:a="http://schemas.openxmlformats.org/drawingml/2006/main" xmlns:r="http://schemas.openxmlformats.org/officeDocument/2006/relationships" xmlns:p="http://schemas.openxmlformats.org/presentationml/2006/main" show="0">
+  <p:cSld>
+    <p:spTree>
+      <p:nvGrpSpPr>
+        <p:cNvPr id="1" name=""/>
+        <p:cNvGrpSpPr/>
+        <p:nvPr/>
+      </p:nvGrpSpPr>
+      <p:grpSpPr>
+        <a:xfrm>
+          <a:off x="0" y="0"/>
+          <a:ext cx="0" cy="0"/>
+          <a:chOff x="0" y="0"/>
+          <a:chExt cx="0" cy="0"/>
+        </a:xfrm>
+      </p:grpSpPr>
+      <p:sp>
+        <p:nvSpPr>
           <p:cNvPr id="16" name="Rectangle 15"/>
           <p:cNvSpPr/>
           <p:nvPr/>
@@ -16529,6 +16883,9 @@
             <a:endParaRPr lang="en-US" sz="2800" dirty="0" smtClean="0"/>
           </a:p>
           <a:p>
+            <a:endParaRPr lang="en-US" sz="2800" dirty="0" smtClean="0"/>
+          </a:p>
+          <a:p>
             <a:r>
               <a:rPr lang="en-US" sz="2800" dirty="0" smtClean="0"/>
               <a:t>~50 % of code (</a:t>
@@ -16548,7 +16905,13 @@
               <a:rPr lang="en-US" sz="2400" dirty="0" smtClean="0">
                 <a:sym typeface="Wingdings" panose="05000000000000000000" pitchFamily="2" charset="2"/>
               </a:rPr>
-              <a:t>Effort saving is even more significant!</a:t>
+              <a:t>Effort saving is even more significant</a:t>
+            </a:r>
+            <a:r>
+              <a:rPr lang="en-US" sz="2400" dirty="0" smtClean="0">
+                <a:sym typeface="Wingdings" panose="05000000000000000000" pitchFamily="2" charset="2"/>
+              </a:rPr>
+              <a:t>!</a:t>
             </a:r>
           </a:p>
         </p:txBody>
@@ -16706,7 +17069,7 @@
             </a:r>
             <a:fld id="{76AE5747-D0E7-4D66-8FBF-9CFC53A4E0C8}" type="slidenum">
               <a:rPr lang="de-CH" smtClean="0"/>
-              <a:t>24</a:t>
+              <a:t>25</a:t>
             </a:fld>
             <a:endParaRPr lang="de-CH" dirty="0"/>
           </a:p>
@@ -16820,6 +17183,14 @@
   <p:clrMapOvr>
     <a:masterClrMapping/>
   </p:clrMapOvr>
+  <mc:AlternateContent xmlns:mc="http://schemas.openxmlformats.org/markup-compatibility/2006">
+    <mc:Choice xmlns:p14="http://schemas.microsoft.com/office/powerpoint/2010/main" Requires="p14">
+      <p:transition spd="slow" p14:dur="2000"/>
+    </mc:Choice>
+    <mc:Fallback>
+      <p:transition spd="slow"/>
+    </mc:Fallback>
+  </mc:AlternateContent>
   <p:timing>
     <p:tnLst>
       <p:par>
@@ -17066,7 +17437,7 @@
                                         <p:tgtEl>
                                           <p:spTgt spid="2">
                                             <p:txEl>
-                                              <p:pRg st="7" end="7"/>
+                                              <p:pRg st="8" end="8"/>
                                             </p:txEl>
                                           </p:spTgt>
                                         </p:tgtEl>
@@ -17084,7 +17455,7 @@
                                         <p:tgtEl>
                                           <p:spTgt spid="2">
                                             <p:txEl>
-                                              <p:pRg st="7" end="7"/>
+                                              <p:pRg st="8" end="8"/>
                                             </p:txEl>
                                           </p:spTgt>
                                         </p:tgtEl>
@@ -17109,7 +17480,7 @@
                                         <p:tgtEl>
                                           <p:spTgt spid="2">
                                             <p:txEl>
-                                              <p:pRg st="8" end="8"/>
+                                              <p:pRg st="9" end="9"/>
                                             </p:txEl>
                                           </p:spTgt>
                                         </p:tgtEl>
@@ -17127,7 +17498,7 @@
                                         <p:tgtEl>
                                           <p:spTgt spid="2">
                                             <p:txEl>
-                                              <p:pRg st="8" end="8"/>
+                                              <p:pRg st="9" end="9"/>
                                             </p:txEl>
                                           </p:spTgt>
                                         </p:tgtEl>
@@ -17177,7 +17548,7 @@
 </p:sld>
 </file>
 
-<file path=ppt/slides/slide25.xml><?xml version="1.0" encoding="utf-8"?>
+<file path=ppt/slides/slide26.xml><?xml version="1.0" encoding="utf-8"?>
 <p:sld xmlns:a="http://schemas.openxmlformats.org/drawingml/2006/main" xmlns:r="http://schemas.openxmlformats.org/officeDocument/2006/relationships" xmlns:p="http://schemas.openxmlformats.org/presentationml/2006/main">
   <p:cSld>
     <p:spTree>
@@ -17194,29 +17565,6 @@
           <a:chExt cx="0" cy="0"/>
         </a:xfrm>
       </p:grpSpPr>
-      <p:sp>
-        <p:nvSpPr>
-          <p:cNvPr id="3" name="Title 2"/>
-          <p:cNvSpPr>
-            <a:spLocks noGrp="1"/>
-          </p:cNvSpPr>
-          <p:nvPr>
-            <p:ph type="title"/>
-          </p:nvPr>
-        </p:nvSpPr>
-        <p:spPr/>
-        <p:txBody>
-          <a:bodyPr/>
-          <a:lstStyle/>
-          <a:p>
-            <a:r>
-              <a:rPr lang="en-US" dirty="0" smtClean="0"/>
-              <a:t>Questions</a:t>
-            </a:r>
-            <a:endParaRPr lang="en-US" dirty="0"/>
-          </a:p>
-        </p:txBody>
-      </p:sp>
       <p:pic>
         <p:nvPicPr>
           <p:cNvPr id="1028" name="Picture 4" descr="http://www.celticwatersolutions.ie/uploads/images/Question%20About%20Water%20Filtration.jpg"/>
@@ -17238,7 +17586,7 @@
         </p:blipFill>
         <p:spPr bwMode="auto">
           <a:xfrm>
-            <a:off x="2762547" y="1789353"/>
+            <a:off x="4572000" y="1718064"/>
             <a:ext cx="3638550" cy="4761538"/>
           </a:xfrm>
           <a:prstGeom prst="rect">
@@ -17258,6 +17606,110 @@
       </p:pic>
       <p:sp>
         <p:nvSpPr>
+          <p:cNvPr id="2" name="Content Placeholder 1"/>
+          <p:cNvSpPr>
+            <a:spLocks noGrp="1"/>
+          </p:cNvSpPr>
+          <p:nvPr>
+            <p:ph idx="1"/>
+          </p:nvPr>
+        </p:nvSpPr>
+        <p:spPr/>
+        <p:txBody>
+          <a:bodyPr/>
+          <a:lstStyle/>
+          <a:p>
+            <a:r>
+              <a:rPr lang="en-US" dirty="0" err="1" smtClean="0"/>
+              <a:t>GitHub</a:t>
+            </a:r>
+            <a:r>
+              <a:rPr lang="en-US" dirty="0" smtClean="0"/>
+              <a:t> repository</a:t>
+            </a:r>
+          </a:p>
+          <a:p>
+            <a:pPr lvl="1"/>
+            <a:r>
+              <a:rPr lang="en-US" dirty="0" smtClean="0">
+                <a:hlinkClick r:id="rId3"/>
+              </a:rPr>
+              <a:t>https</a:t>
+            </a:r>
+            <a:r>
+              <a:rPr lang="en-US" dirty="0">
+                <a:hlinkClick r:id="rId3"/>
+              </a:rPr>
+              <a:t>://</a:t>
+            </a:r>
+            <a:r>
+              <a:rPr lang="en-US" dirty="0" smtClean="0">
+                <a:hlinkClick r:id="rId3"/>
+              </a:rPr>
+              <a:t>github.com/brunnurs/zxm</a:t>
+            </a:r>
+            <a:endParaRPr lang="en-US" dirty="0"/>
+          </a:p>
+          <a:p>
+            <a:endParaRPr lang="en-US" dirty="0"/>
+          </a:p>
+        </p:txBody>
+      </p:sp>
+      <p:sp>
+        <p:nvSpPr>
+          <p:cNvPr id="3" name="Title 2"/>
+          <p:cNvSpPr>
+            <a:spLocks noGrp="1"/>
+          </p:cNvSpPr>
+          <p:nvPr>
+            <p:ph type="title"/>
+          </p:nvPr>
+        </p:nvSpPr>
+        <p:spPr/>
+        <p:txBody>
+          <a:bodyPr/>
+          <a:lstStyle/>
+          <a:p>
+            <a:r>
+              <a:rPr lang="en-US" dirty="0" smtClean="0"/>
+              <a:t>Thank You!</a:t>
+            </a:r>
+            <a:br>
+              <a:rPr lang="en-US" dirty="0" smtClean="0"/>
+            </a:br>
+            <a:r>
+              <a:rPr lang="en-US" dirty="0" smtClean="0"/>
+              <a:t>Questions?</a:t>
+            </a:r>
+            <a:endParaRPr lang="en-US" dirty="0"/>
+          </a:p>
+        </p:txBody>
+      </p:sp>
+      <p:sp>
+        <p:nvSpPr>
+          <p:cNvPr id="8" name="Date Placeholder 7"/>
+          <p:cNvSpPr>
+            <a:spLocks noGrp="1"/>
+          </p:cNvSpPr>
+          <p:nvPr>
+            <p:ph type="dt" sz="half" idx="10"/>
+          </p:nvPr>
+        </p:nvSpPr>
+        <p:spPr/>
+        <p:txBody>
+          <a:bodyPr/>
+          <a:lstStyle/>
+          <a:p>
+            <a:r>
+              <a:rPr lang="en-US" smtClean="0"/>
+              <a:t>26. September 2013</a:t>
+            </a:r>
+            <a:endParaRPr lang="de-CH" dirty="0"/>
+          </a:p>
+        </p:txBody>
+      </p:sp>
+      <p:sp>
+        <p:nvSpPr>
           <p:cNvPr id="6" name="Footer Placeholder 5"/>
           <p:cNvSpPr>
             <a:spLocks noGrp="1"/>
@@ -17281,29 +17733,6 @@
       </p:sp>
       <p:sp>
         <p:nvSpPr>
-          <p:cNvPr id="8" name="Date Placeholder 7"/>
-          <p:cNvSpPr>
-            <a:spLocks noGrp="1"/>
-          </p:cNvSpPr>
-          <p:nvPr>
-            <p:ph type="dt" sz="half" idx="10"/>
-          </p:nvPr>
-        </p:nvSpPr>
-        <p:spPr/>
-        <p:txBody>
-          <a:bodyPr/>
-          <a:lstStyle/>
-          <a:p>
-            <a:r>
-              <a:rPr lang="en-US" smtClean="0"/>
-              <a:t>26. September 2013</a:t>
-            </a:r>
-            <a:endParaRPr lang="de-CH" dirty="0"/>
-          </a:p>
-        </p:txBody>
-      </p:sp>
-      <p:sp>
-        <p:nvSpPr>
           <p:cNvPr id="9" name="Slide Number Placeholder 8"/>
           <p:cNvSpPr>
             <a:spLocks noGrp="1"/>
@@ -17323,7 +17752,7 @@
             </a:r>
             <a:fld id="{EA382A82-52C3-4CAB-89F1-38331029E314}" type="slidenum">
               <a:rPr lang="de-CH" smtClean="0"/>
-              <a:t>25</a:t>
+              <a:t>26</a:t>
             </a:fld>
             <a:endParaRPr lang="de-CH" dirty="0"/>
           </a:p>
@@ -17349,7 +17778,7 @@
 </p:sld>
 </file>
 
-<file path=ppt/slides/slide26.xml><?xml version="1.0" encoding="utf-8"?>
+<file path=ppt/slides/slide27.xml><?xml version="1.0" encoding="utf-8"?>
 <p:sld xmlns:a="http://schemas.openxmlformats.org/drawingml/2006/main" xmlns:r="http://schemas.openxmlformats.org/officeDocument/2006/relationships" xmlns:p="http://schemas.openxmlformats.org/presentationml/2006/main">
   <p:cSld>
     <p:spTree>
@@ -17487,7 +17916,7 @@
             </a:r>
             <a:fld id="{7B09883B-D8DA-4C40-AD18-6B0B2D9537FF}" type="slidenum">
               <a:rPr lang="de-CH" smtClean="0"/>
-              <a:t>26</a:t>
+              <a:t>27</a:t>
             </a:fld>
             <a:endParaRPr lang="de-CH" dirty="0"/>
           </a:p>
@@ -17543,7 +17972,7 @@
 </p:sld>
 </file>
 
-<file path=ppt/slides/slide27.xml><?xml version="1.0" encoding="utf-8"?>
+<file path=ppt/slides/slide28.xml><?xml version="1.0" encoding="utf-8"?>
 <p:sld xmlns:a="http://schemas.openxmlformats.org/drawingml/2006/main" xmlns:r="http://schemas.openxmlformats.org/officeDocument/2006/relationships" xmlns:p="http://schemas.openxmlformats.org/presentationml/2006/main">
   <p:cSld>
     <p:spTree>
@@ -17657,7 +18086,7 @@
             </a:r>
             <a:fld id="{7481FCEA-C37D-4243-8F22-4CC0415B3695}" type="slidenum">
               <a:rPr lang="de-CH" smtClean="0"/>
-              <a:t>27</a:t>
+              <a:t>28</a:t>
             </a:fld>
             <a:endParaRPr lang="de-CH" dirty="0"/>
           </a:p>
@@ -17713,7 +18142,7 @@
 </p:sld>
 </file>
 
-<file path=ppt/slides/slide28.xml><?xml version="1.0" encoding="utf-8"?>
+<file path=ppt/slides/slide29.xml><?xml version="1.0" encoding="utf-8"?>
 <p:sld xmlns:a="http://schemas.openxmlformats.org/drawingml/2006/main" xmlns:r="http://schemas.openxmlformats.org/officeDocument/2006/relationships" xmlns:p="http://schemas.openxmlformats.org/presentationml/2006/main">
   <p:cSld>
     <p:spTree>
@@ -17861,7 +18290,7 @@
             </a:r>
             <a:fld id="{46E01C9A-4F0E-450E-B8F9-72C16FDD6F64}" type="slidenum">
               <a:rPr lang="de-CH" smtClean="0"/>
-              <a:t>28</a:t>
+              <a:t>29</a:t>
             </a:fld>
             <a:endParaRPr lang="de-CH" dirty="0"/>
           </a:p>
@@ -17887,7 +18316,375 @@
 </p:sld>
 </file>
 
-<file path=ppt/slides/slide29.xml><?xml version="1.0" encoding="utf-8"?>
+<file path=ppt/slides/slide3.xml><?xml version="1.0" encoding="utf-8"?>
+<p:sld xmlns:a="http://schemas.openxmlformats.org/drawingml/2006/main" xmlns:r="http://schemas.openxmlformats.org/officeDocument/2006/relationships" xmlns:p="http://schemas.openxmlformats.org/presentationml/2006/main">
+  <p:cSld>
+    <p:spTree>
+      <p:nvGrpSpPr>
+        <p:cNvPr id="1" name=""/>
+        <p:cNvGrpSpPr/>
+        <p:nvPr/>
+      </p:nvGrpSpPr>
+      <p:grpSpPr>
+        <a:xfrm>
+          <a:off x="0" y="0"/>
+          <a:ext cx="0" cy="0"/>
+          <a:chOff x="0" y="0"/>
+          <a:chExt cx="0" cy="0"/>
+        </a:xfrm>
+      </p:grpSpPr>
+      <p:sp>
+        <p:nvSpPr>
+          <p:cNvPr id="2" name="Content Placeholder 1"/>
+          <p:cNvSpPr>
+            <a:spLocks noGrp="1"/>
+          </p:cNvSpPr>
+          <p:nvPr>
+            <p:ph idx="1"/>
+          </p:nvPr>
+        </p:nvSpPr>
+        <p:spPr>
+          <a:xfrm>
+            <a:off x="152082" y="1646775"/>
+            <a:ext cx="8839836" cy="4847688"/>
+          </a:xfrm>
+        </p:spPr>
+        <p:txBody>
+          <a:bodyPr/>
+          <a:lstStyle/>
+          <a:p>
+            <a:pPr marL="457200" indent="-457200">
+              <a:buFont typeface="+mj-lt"/>
+              <a:buAutoNum type="arabicPeriod"/>
+            </a:pPr>
+            <a:r>
+              <a:rPr lang="en-US" dirty="0" smtClean="0"/>
+              <a:t>Introduction					</a:t>
+            </a:r>
+            <a:r>
+              <a:rPr lang="en-US" dirty="0" smtClean="0">
+                <a:latin typeface="+mn-lt"/>
+              </a:rPr>
+              <a:t>10’	</a:t>
+            </a:r>
+            <a:r>
+              <a:rPr lang="en-US" dirty="0" err="1" smtClean="0">
+                <a:latin typeface="+mn-lt"/>
+              </a:rPr>
+              <a:t>olb</a:t>
+            </a:r>
+            <a:endParaRPr lang="en-US" dirty="0" smtClean="0">
+              <a:latin typeface="+mn-lt"/>
+            </a:endParaRPr>
+          </a:p>
+          <a:p>
+            <a:pPr marL="457200" indent="-457200">
+              <a:buFont typeface="+mj-lt"/>
+              <a:buAutoNum type="arabicPeriod"/>
+            </a:pPr>
+            <a:r>
+              <a:rPr lang="en-US" dirty="0" smtClean="0"/>
+              <a:t>Building the “</a:t>
+            </a:r>
+            <a:r>
+              <a:rPr lang="en-US" dirty="0" smtClean="0">
+                <a:solidFill>
+                  <a:schemeClr val="accent1"/>
+                </a:solidFill>
+              </a:rPr>
+              <a:t>Z</a:t>
+            </a:r>
+            <a:r>
+              <a:rPr lang="en-US" dirty="0" smtClean="0"/>
+              <a:t>ühlke </a:t>
+            </a:r>
+            <a:r>
+              <a:rPr lang="en-US" dirty="0" smtClean="0">
+                <a:solidFill>
+                  <a:schemeClr val="accent1"/>
+                </a:solidFill>
+              </a:rPr>
+              <a:t>X</a:t>
+            </a:r>
+            <a:r>
+              <a:rPr lang="en-US" dirty="0" smtClean="0"/>
+              <a:t>-Platform </a:t>
+            </a:r>
+            <a:r>
+              <a:rPr lang="en-US" dirty="0" smtClean="0">
+                <a:solidFill>
+                  <a:schemeClr val="accent1"/>
+                </a:solidFill>
+              </a:rPr>
+              <a:t>M</a:t>
+            </a:r>
+            <a:r>
+              <a:rPr lang="en-US" dirty="0" smtClean="0"/>
+              <a:t>essenger”	</a:t>
+            </a:r>
+            <a:r>
+              <a:rPr lang="en-US" dirty="0" smtClean="0">
+                <a:latin typeface="+mn-lt"/>
+              </a:rPr>
+              <a:t>45’	</a:t>
+            </a:r>
+            <a:r>
+              <a:rPr lang="en-US" dirty="0" err="1" smtClean="0">
+                <a:latin typeface="+mn-lt"/>
+              </a:rPr>
+              <a:t>ssh</a:t>
+            </a:r>
+            <a:r>
+              <a:rPr lang="en-US" dirty="0" smtClean="0">
+                <a:latin typeface="+mn-lt"/>
+              </a:rPr>
+              <a:t>/</a:t>
+            </a:r>
+            <a:r>
+              <a:rPr lang="en-US" dirty="0" err="1" smtClean="0">
+                <a:latin typeface="+mn-lt"/>
+              </a:rPr>
+              <a:t>urb</a:t>
+            </a:r>
+            <a:endParaRPr lang="en-US" dirty="0">
+              <a:latin typeface="+mn-lt"/>
+            </a:endParaRPr>
+          </a:p>
+          <a:p>
+            <a:pPr lvl="3"/>
+            <a:r>
+              <a:rPr lang="en-US" dirty="0" smtClean="0">
+                <a:latin typeface="+mn-lt"/>
+              </a:rPr>
+              <a:t>Role playing</a:t>
+            </a:r>
+          </a:p>
+          <a:p>
+            <a:pPr lvl="3"/>
+            <a:r>
+              <a:rPr lang="en-US" dirty="0" smtClean="0">
+                <a:latin typeface="+mn-lt"/>
+              </a:rPr>
+              <a:t>Live coding</a:t>
+            </a:r>
+          </a:p>
+          <a:p>
+            <a:pPr marL="457200" indent="-457200">
+              <a:buFont typeface="+mj-lt"/>
+              <a:buAutoNum type="arabicPeriod"/>
+            </a:pPr>
+            <a:r>
+              <a:rPr lang="en-US" dirty="0" smtClean="0"/>
+              <a:t>Questions						  </a:t>
+            </a:r>
+            <a:r>
+              <a:rPr lang="en-US" dirty="0" smtClean="0">
+                <a:latin typeface="+mn-lt"/>
+              </a:rPr>
+              <a:t>5’</a:t>
+            </a:r>
+          </a:p>
+          <a:p>
+            <a:pPr marL="457200" indent="-457200">
+              <a:buFont typeface="+mj-lt"/>
+              <a:buAutoNum type="arabicPeriod"/>
+            </a:pPr>
+            <a:r>
+              <a:rPr lang="en-US" dirty="0" err="1" smtClean="0"/>
+              <a:t>myBosch</a:t>
+            </a:r>
+            <a:r>
+              <a:rPr lang="en-US" dirty="0" smtClean="0"/>
+              <a:t> App: Experiences				</a:t>
+            </a:r>
+            <a:r>
+              <a:rPr lang="en-US" dirty="0" smtClean="0">
+                <a:latin typeface="+mn-lt"/>
+              </a:rPr>
+              <a:t>10’	</a:t>
+            </a:r>
+            <a:r>
+              <a:rPr lang="en-US" dirty="0" err="1" smtClean="0">
+                <a:latin typeface="+mn-lt"/>
+              </a:rPr>
+              <a:t>kwl</a:t>
+            </a:r>
+            <a:endParaRPr lang="en-US" dirty="0" smtClean="0">
+              <a:latin typeface="+mn-lt"/>
+            </a:endParaRPr>
+          </a:p>
+          <a:p>
+            <a:pPr marL="457200" indent="-457200">
+              <a:buFont typeface="+mj-lt"/>
+              <a:buAutoNum type="arabicPeriod"/>
+            </a:pPr>
+            <a:r>
+              <a:rPr lang="en-US" dirty="0" smtClean="0"/>
+              <a:t>Zühlke as </a:t>
+            </a:r>
+            <a:r>
+              <a:rPr lang="en-US" dirty="0" err="1" smtClean="0"/>
+              <a:t>Xamarin’s</a:t>
+            </a:r>
+            <a:r>
+              <a:rPr lang="en-US" dirty="0"/>
+              <a:t> Premium Consulting </a:t>
+            </a:r>
+            <a:r>
+              <a:rPr lang="en-US" dirty="0" smtClean="0"/>
+              <a:t>Partner	</a:t>
+            </a:r>
+            <a:r>
+              <a:rPr lang="en-US" dirty="0" smtClean="0">
+                <a:latin typeface="+mn-lt"/>
+              </a:rPr>
+              <a:t>10’	</a:t>
+            </a:r>
+            <a:r>
+              <a:rPr lang="en-US" dirty="0" err="1" smtClean="0">
+                <a:latin typeface="+mn-lt"/>
+              </a:rPr>
+              <a:t>kls</a:t>
+            </a:r>
+            <a:endParaRPr lang="en-US" dirty="0" smtClean="0">
+              <a:latin typeface="+mn-lt"/>
+            </a:endParaRPr>
+          </a:p>
+          <a:p>
+            <a:pPr marL="457200" indent="-457200">
+              <a:buFont typeface="+mj-lt"/>
+              <a:buAutoNum type="arabicPeriod"/>
+            </a:pPr>
+            <a:r>
+              <a:rPr lang="en-US" dirty="0" smtClean="0"/>
+              <a:t>Discussion						</a:t>
+            </a:r>
+            <a:r>
+              <a:rPr lang="en-US" dirty="0" smtClean="0">
+                <a:latin typeface="+mn-lt"/>
+              </a:rPr>
+              <a:t>10’</a:t>
+            </a:r>
+          </a:p>
+        </p:txBody>
+      </p:sp>
+      <p:sp>
+        <p:nvSpPr>
+          <p:cNvPr id="3" name="Title 2"/>
+          <p:cNvSpPr>
+            <a:spLocks noGrp="1"/>
+          </p:cNvSpPr>
+          <p:nvPr>
+            <p:ph type="title"/>
+          </p:nvPr>
+        </p:nvSpPr>
+        <p:spPr/>
+        <p:txBody>
+          <a:bodyPr/>
+          <a:lstStyle/>
+          <a:p>
+            <a:r>
+              <a:rPr lang="en-US" dirty="0" smtClean="0"/>
+              <a:t>Agenda</a:t>
+            </a:r>
+            <a:endParaRPr lang="en-US" dirty="0"/>
+          </a:p>
+        </p:txBody>
+      </p:sp>
+      <p:sp>
+        <p:nvSpPr>
+          <p:cNvPr id="5" name="Footer Placeholder 4"/>
+          <p:cNvSpPr>
+            <a:spLocks noGrp="1"/>
+          </p:cNvSpPr>
+          <p:nvPr>
+            <p:ph type="ftr" sz="quarter" idx="11"/>
+          </p:nvPr>
+        </p:nvSpPr>
+        <p:spPr/>
+        <p:txBody>
+          <a:bodyPr/>
+          <a:lstStyle/>
+          <a:p>
+            <a:r>
+              <a:rPr lang="en-US" smtClean="0"/>
+              <a:t>Cross-platform Mobile Development | Ursin Brunner, Stefan Schöb, Oliver Brack</a:t>
+            </a:r>
+            <a:endParaRPr lang="en-US" dirty="0"/>
+          </a:p>
+        </p:txBody>
+      </p:sp>
+      <p:sp>
+        <p:nvSpPr>
+          <p:cNvPr id="9" name="Date Placeholder 8"/>
+          <p:cNvSpPr>
+            <a:spLocks noGrp="1"/>
+          </p:cNvSpPr>
+          <p:nvPr>
+            <p:ph type="dt" sz="half" idx="10"/>
+          </p:nvPr>
+        </p:nvSpPr>
+        <p:spPr/>
+        <p:txBody>
+          <a:bodyPr/>
+          <a:lstStyle/>
+          <a:p>
+            <a:r>
+              <a:rPr lang="en-US" smtClean="0"/>
+              <a:t>26. September 2013</a:t>
+            </a:r>
+            <a:endParaRPr lang="de-CH" dirty="0"/>
+          </a:p>
+        </p:txBody>
+      </p:sp>
+      <p:sp>
+        <p:nvSpPr>
+          <p:cNvPr id="10" name="Slide Number Placeholder 9"/>
+          <p:cNvSpPr>
+            <a:spLocks noGrp="1"/>
+          </p:cNvSpPr>
+          <p:nvPr>
+            <p:ph type="sldNum" sz="quarter" idx="12"/>
+          </p:nvPr>
+        </p:nvSpPr>
+        <p:spPr/>
+        <p:txBody>
+          <a:bodyPr/>
+          <a:lstStyle/>
+          <a:p>
+            <a:r>
+              <a:rPr lang="de-CH" smtClean="0"/>
+              <a:t>Slide </a:t>
+            </a:r>
+            <a:fld id="{7C8AE9C6-1CD8-484E-9750-DD723D6E9BEA}" type="slidenum">
+              <a:rPr lang="de-CH" smtClean="0"/>
+              <a:t>3</a:t>
+            </a:fld>
+            <a:endParaRPr lang="de-CH" dirty="0"/>
+          </a:p>
+        </p:txBody>
+      </p:sp>
+    </p:spTree>
+    <p:extLst>
+      <p:ext uri="{BB962C8B-B14F-4D97-AF65-F5344CB8AC3E}">
+        <p14:creationId xmlns:p14="http://schemas.microsoft.com/office/powerpoint/2010/main" val="248274490"/>
+      </p:ext>
+    </p:extLst>
+  </p:cSld>
+  <p:clrMapOvr>
+    <a:masterClrMapping/>
+  </p:clrMapOvr>
+  <p:timing>
+    <p:tnLst>
+      <p:par>
+        <p:cTn id="1" dur="indefinite" restart="never" nodeType="tmRoot"/>
+      </p:par>
+    </p:tnLst>
+  </p:timing>
+</p:sld>
+</file>
+
+<file path=ppt/slides/slide30.xml><?xml version="1.0" encoding="utf-8"?>
 <p:sld xmlns:a="http://schemas.openxmlformats.org/drawingml/2006/main" xmlns:r="http://schemas.openxmlformats.org/officeDocument/2006/relationships" xmlns:p="http://schemas.openxmlformats.org/presentationml/2006/main">
   <p:cSld>
     <p:spTree>
@@ -18249,7 +19046,7 @@
             </a:r>
             <a:fld id="{3A0CAE62-62EF-4FE6-8C36-CD1035D976E5}" type="slidenum">
               <a:rPr lang="de-CH" smtClean="0"/>
-              <a:t>29</a:t>
+              <a:t>30</a:t>
             </a:fld>
             <a:endParaRPr lang="de-CH" dirty="0"/>
           </a:p>
@@ -18413,374 +19210,6 @@
     <p:extLst>
       <p:ext uri="{BB962C8B-B14F-4D97-AF65-F5344CB8AC3E}">
         <p14:creationId xmlns:p14="http://schemas.microsoft.com/office/powerpoint/2010/main" val="1712907130"/>
-      </p:ext>
-    </p:extLst>
-  </p:cSld>
-  <p:clrMapOvr>
-    <a:masterClrMapping/>
-  </p:clrMapOvr>
-  <p:timing>
-    <p:tnLst>
-      <p:par>
-        <p:cTn id="1" dur="indefinite" restart="never" nodeType="tmRoot"/>
-      </p:par>
-    </p:tnLst>
-  </p:timing>
-</p:sld>
-</file>
-
-<file path=ppt/slides/slide3.xml><?xml version="1.0" encoding="utf-8"?>
-<p:sld xmlns:a="http://schemas.openxmlformats.org/drawingml/2006/main" xmlns:r="http://schemas.openxmlformats.org/officeDocument/2006/relationships" xmlns:p="http://schemas.openxmlformats.org/presentationml/2006/main">
-  <p:cSld>
-    <p:spTree>
-      <p:nvGrpSpPr>
-        <p:cNvPr id="1" name=""/>
-        <p:cNvGrpSpPr/>
-        <p:nvPr/>
-      </p:nvGrpSpPr>
-      <p:grpSpPr>
-        <a:xfrm>
-          <a:off x="0" y="0"/>
-          <a:ext cx="0" cy="0"/>
-          <a:chOff x="0" y="0"/>
-          <a:chExt cx="0" cy="0"/>
-        </a:xfrm>
-      </p:grpSpPr>
-      <p:sp>
-        <p:nvSpPr>
-          <p:cNvPr id="2" name="Content Placeholder 1"/>
-          <p:cNvSpPr>
-            <a:spLocks noGrp="1"/>
-          </p:cNvSpPr>
-          <p:nvPr>
-            <p:ph idx="1"/>
-          </p:nvPr>
-        </p:nvSpPr>
-        <p:spPr>
-          <a:xfrm>
-            <a:off x="152082" y="1646775"/>
-            <a:ext cx="8839836" cy="4847688"/>
-          </a:xfrm>
-        </p:spPr>
-        <p:txBody>
-          <a:bodyPr/>
-          <a:lstStyle/>
-          <a:p>
-            <a:pPr marL="457200" indent="-457200">
-              <a:buFont typeface="+mj-lt"/>
-              <a:buAutoNum type="arabicPeriod"/>
-            </a:pPr>
-            <a:r>
-              <a:rPr lang="en-US" dirty="0" smtClean="0"/>
-              <a:t>Introduction					</a:t>
-            </a:r>
-            <a:r>
-              <a:rPr lang="en-US" dirty="0" smtClean="0">
-                <a:latin typeface="+mn-lt"/>
-              </a:rPr>
-              <a:t>10’	</a:t>
-            </a:r>
-            <a:r>
-              <a:rPr lang="en-US" dirty="0" err="1" smtClean="0">
-                <a:latin typeface="+mn-lt"/>
-              </a:rPr>
-              <a:t>olb</a:t>
-            </a:r>
-            <a:endParaRPr lang="en-US" dirty="0" smtClean="0">
-              <a:latin typeface="+mn-lt"/>
-            </a:endParaRPr>
-          </a:p>
-          <a:p>
-            <a:pPr marL="457200" indent="-457200">
-              <a:buFont typeface="+mj-lt"/>
-              <a:buAutoNum type="arabicPeriod"/>
-            </a:pPr>
-            <a:r>
-              <a:rPr lang="en-US" dirty="0" smtClean="0"/>
-              <a:t>Building the “</a:t>
-            </a:r>
-            <a:r>
-              <a:rPr lang="en-US" dirty="0" smtClean="0">
-                <a:solidFill>
-                  <a:schemeClr val="accent1"/>
-                </a:solidFill>
-              </a:rPr>
-              <a:t>Z</a:t>
-            </a:r>
-            <a:r>
-              <a:rPr lang="en-US" dirty="0" smtClean="0"/>
-              <a:t>ühlke </a:t>
-            </a:r>
-            <a:r>
-              <a:rPr lang="en-US" dirty="0" smtClean="0">
-                <a:solidFill>
-                  <a:schemeClr val="accent1"/>
-                </a:solidFill>
-              </a:rPr>
-              <a:t>X</a:t>
-            </a:r>
-            <a:r>
-              <a:rPr lang="en-US" dirty="0" smtClean="0"/>
-              <a:t>-Platform </a:t>
-            </a:r>
-            <a:r>
-              <a:rPr lang="en-US" dirty="0" smtClean="0">
-                <a:solidFill>
-                  <a:schemeClr val="accent1"/>
-                </a:solidFill>
-              </a:rPr>
-              <a:t>M</a:t>
-            </a:r>
-            <a:r>
-              <a:rPr lang="en-US" dirty="0" smtClean="0"/>
-              <a:t>essenger”	</a:t>
-            </a:r>
-            <a:r>
-              <a:rPr lang="en-US" dirty="0" smtClean="0">
-                <a:latin typeface="+mn-lt"/>
-              </a:rPr>
-              <a:t>45’	</a:t>
-            </a:r>
-            <a:r>
-              <a:rPr lang="en-US" dirty="0" err="1" smtClean="0">
-                <a:latin typeface="+mn-lt"/>
-              </a:rPr>
-              <a:t>ssh</a:t>
-            </a:r>
-            <a:r>
-              <a:rPr lang="en-US" dirty="0" smtClean="0">
-                <a:latin typeface="+mn-lt"/>
-              </a:rPr>
-              <a:t>/</a:t>
-            </a:r>
-            <a:r>
-              <a:rPr lang="en-US" dirty="0" err="1" smtClean="0">
-                <a:latin typeface="+mn-lt"/>
-              </a:rPr>
-              <a:t>urb</a:t>
-            </a:r>
-            <a:endParaRPr lang="en-US" dirty="0">
-              <a:latin typeface="+mn-lt"/>
-            </a:endParaRPr>
-          </a:p>
-          <a:p>
-            <a:pPr lvl="3"/>
-            <a:r>
-              <a:rPr lang="en-US" dirty="0" smtClean="0">
-                <a:latin typeface="+mn-lt"/>
-              </a:rPr>
-              <a:t>Role playing</a:t>
-            </a:r>
-          </a:p>
-          <a:p>
-            <a:pPr lvl="3"/>
-            <a:r>
-              <a:rPr lang="en-US" dirty="0" smtClean="0">
-                <a:latin typeface="+mn-lt"/>
-              </a:rPr>
-              <a:t>Live coding</a:t>
-            </a:r>
-          </a:p>
-          <a:p>
-            <a:pPr marL="457200" indent="-457200">
-              <a:buFont typeface="+mj-lt"/>
-              <a:buAutoNum type="arabicPeriod"/>
-            </a:pPr>
-            <a:r>
-              <a:rPr lang="en-US" dirty="0" smtClean="0"/>
-              <a:t>Questions						  </a:t>
-            </a:r>
-            <a:r>
-              <a:rPr lang="en-US" dirty="0" smtClean="0">
-                <a:latin typeface="+mn-lt"/>
-              </a:rPr>
-              <a:t>5’</a:t>
-            </a:r>
-          </a:p>
-          <a:p>
-            <a:pPr marL="457200" indent="-457200">
-              <a:buFont typeface="+mj-lt"/>
-              <a:buAutoNum type="arabicPeriod"/>
-            </a:pPr>
-            <a:r>
-              <a:rPr lang="en-US" dirty="0" err="1" smtClean="0"/>
-              <a:t>myBosch</a:t>
-            </a:r>
-            <a:r>
-              <a:rPr lang="en-US" dirty="0" smtClean="0"/>
-              <a:t> App: Experiences				</a:t>
-            </a:r>
-            <a:r>
-              <a:rPr lang="en-US" dirty="0" smtClean="0">
-                <a:latin typeface="+mn-lt"/>
-              </a:rPr>
-              <a:t>10’	</a:t>
-            </a:r>
-            <a:r>
-              <a:rPr lang="en-US" dirty="0" err="1" smtClean="0">
-                <a:latin typeface="+mn-lt"/>
-              </a:rPr>
-              <a:t>kwl</a:t>
-            </a:r>
-            <a:endParaRPr lang="en-US" dirty="0" smtClean="0">
-              <a:latin typeface="+mn-lt"/>
-            </a:endParaRPr>
-          </a:p>
-          <a:p>
-            <a:pPr marL="457200" indent="-457200">
-              <a:buFont typeface="+mj-lt"/>
-              <a:buAutoNum type="arabicPeriod"/>
-            </a:pPr>
-            <a:r>
-              <a:rPr lang="en-US" dirty="0" smtClean="0"/>
-              <a:t>Zühlke as </a:t>
-            </a:r>
-            <a:r>
-              <a:rPr lang="en-US" dirty="0" err="1" smtClean="0"/>
-              <a:t>Xamarin’s</a:t>
-            </a:r>
-            <a:r>
-              <a:rPr lang="en-US" dirty="0"/>
-              <a:t> Premium Consulting </a:t>
-            </a:r>
-            <a:r>
-              <a:rPr lang="en-US" dirty="0" smtClean="0"/>
-              <a:t>Partner	</a:t>
-            </a:r>
-            <a:r>
-              <a:rPr lang="en-US" dirty="0" smtClean="0">
-                <a:latin typeface="+mn-lt"/>
-              </a:rPr>
-              <a:t>10’	</a:t>
-            </a:r>
-            <a:r>
-              <a:rPr lang="en-US" dirty="0" err="1" smtClean="0">
-                <a:latin typeface="+mn-lt"/>
-              </a:rPr>
-              <a:t>kls</a:t>
-            </a:r>
-            <a:endParaRPr lang="en-US" dirty="0" smtClean="0">
-              <a:latin typeface="+mn-lt"/>
-            </a:endParaRPr>
-          </a:p>
-          <a:p>
-            <a:pPr marL="457200" indent="-457200">
-              <a:buFont typeface="+mj-lt"/>
-              <a:buAutoNum type="arabicPeriod"/>
-            </a:pPr>
-            <a:r>
-              <a:rPr lang="en-US" dirty="0" smtClean="0"/>
-              <a:t>Discussion						</a:t>
-            </a:r>
-            <a:r>
-              <a:rPr lang="en-US" dirty="0" smtClean="0">
-                <a:latin typeface="+mn-lt"/>
-              </a:rPr>
-              <a:t>10’</a:t>
-            </a:r>
-          </a:p>
-        </p:txBody>
-      </p:sp>
-      <p:sp>
-        <p:nvSpPr>
-          <p:cNvPr id="3" name="Title 2"/>
-          <p:cNvSpPr>
-            <a:spLocks noGrp="1"/>
-          </p:cNvSpPr>
-          <p:nvPr>
-            <p:ph type="title"/>
-          </p:nvPr>
-        </p:nvSpPr>
-        <p:spPr/>
-        <p:txBody>
-          <a:bodyPr/>
-          <a:lstStyle/>
-          <a:p>
-            <a:r>
-              <a:rPr lang="en-US" dirty="0" smtClean="0"/>
-              <a:t>Agenda</a:t>
-            </a:r>
-            <a:endParaRPr lang="en-US" dirty="0"/>
-          </a:p>
-        </p:txBody>
-      </p:sp>
-      <p:sp>
-        <p:nvSpPr>
-          <p:cNvPr id="5" name="Footer Placeholder 4"/>
-          <p:cNvSpPr>
-            <a:spLocks noGrp="1"/>
-          </p:cNvSpPr>
-          <p:nvPr>
-            <p:ph type="ftr" sz="quarter" idx="11"/>
-          </p:nvPr>
-        </p:nvSpPr>
-        <p:spPr/>
-        <p:txBody>
-          <a:bodyPr/>
-          <a:lstStyle/>
-          <a:p>
-            <a:r>
-              <a:rPr lang="en-US" smtClean="0"/>
-              <a:t>Cross-platform Mobile Development | Ursin Brunner, Stefan Schöb, Oliver Brack</a:t>
-            </a:r>
-            <a:endParaRPr lang="en-US" dirty="0"/>
-          </a:p>
-        </p:txBody>
-      </p:sp>
-      <p:sp>
-        <p:nvSpPr>
-          <p:cNvPr id="9" name="Date Placeholder 8"/>
-          <p:cNvSpPr>
-            <a:spLocks noGrp="1"/>
-          </p:cNvSpPr>
-          <p:nvPr>
-            <p:ph type="dt" sz="half" idx="10"/>
-          </p:nvPr>
-        </p:nvSpPr>
-        <p:spPr/>
-        <p:txBody>
-          <a:bodyPr/>
-          <a:lstStyle/>
-          <a:p>
-            <a:r>
-              <a:rPr lang="en-US" smtClean="0"/>
-              <a:t>26. September 2013</a:t>
-            </a:r>
-            <a:endParaRPr lang="de-CH" dirty="0"/>
-          </a:p>
-        </p:txBody>
-      </p:sp>
-      <p:sp>
-        <p:nvSpPr>
-          <p:cNvPr id="10" name="Slide Number Placeholder 9"/>
-          <p:cNvSpPr>
-            <a:spLocks noGrp="1"/>
-          </p:cNvSpPr>
-          <p:nvPr>
-            <p:ph type="sldNum" sz="quarter" idx="12"/>
-          </p:nvPr>
-        </p:nvSpPr>
-        <p:spPr/>
-        <p:txBody>
-          <a:bodyPr/>
-          <a:lstStyle/>
-          <a:p>
-            <a:r>
-              <a:rPr lang="de-CH" smtClean="0"/>
-              <a:t>Slide </a:t>
-            </a:r>
-            <a:fld id="{7C8AE9C6-1CD8-484E-9750-DD723D6E9BEA}" type="slidenum">
-              <a:rPr lang="de-CH" smtClean="0"/>
-              <a:t>3</a:t>
-            </a:fld>
-            <a:endParaRPr lang="de-CH" dirty="0"/>
-          </a:p>
-        </p:txBody>
-      </p:sp>
-    </p:spTree>
-    <p:extLst>
-      <p:ext uri="{BB962C8B-B14F-4D97-AF65-F5344CB8AC3E}">
-        <p14:creationId xmlns:p14="http://schemas.microsoft.com/office/powerpoint/2010/main" val="248274490"/>
       </p:ext>
     </p:extLst>
   </p:cSld>
@@ -26438,7 +26867,15 @@
             <a:pPr lvl="3"/>
             <a:r>
               <a:rPr lang="en-US" sz="2400" dirty="0" smtClean="0"/>
-              <a:t>“Java Binding Library” to use existing JAR libraries</a:t>
+              <a:t>“Java </a:t>
+            </a:r>
+            <a:r>
+              <a:rPr lang="en-US" sz="2400" dirty="0" smtClean="0"/>
+              <a:t>Bindings </a:t>
+            </a:r>
+            <a:r>
+              <a:rPr lang="en-US" sz="2400" dirty="0" smtClean="0"/>
+              <a:t>Library” to use existing JAR libraries</a:t>
             </a:r>
           </a:p>
           <a:p>
@@ -26763,6 +27200,12 @@
 </file>
 
 <file path=ppt/tags/tag17.xml><?xml version="1.0" encoding="utf-8"?>
+<p:tagLst xmlns:a="http://schemas.openxmlformats.org/drawingml/2006/main" xmlns:r="http://schemas.openxmlformats.org/officeDocument/2006/relationships" xmlns:p="http://schemas.openxmlformats.org/presentationml/2006/main">
+  <p:tag name="SHAPETYPE" val="Logo"/>
+</p:tagLst>
+</file>
+
+<file path=ppt/tags/tag18.xml><?xml version="1.0" encoding="utf-8"?>
 <p:tagLst xmlns:a="http://schemas.openxmlformats.org/drawingml/2006/main" xmlns:r="http://schemas.openxmlformats.org/officeDocument/2006/relationships" xmlns:p="http://schemas.openxmlformats.org/presentationml/2006/main">
   <p:tag name="SHAPETYPE" val="Logo"/>
 </p:tagLst>

</xml_diff>